<commit_message>
Minor Tweaks Before Presentation
</commit_message>
<xml_diff>
--- a/DrKCarroll/Units of Measure.pptx
+++ b/DrKCarroll/Units of Measure.pptx
@@ -3964,13 +3964,13 @@
   <p:clrMapOvr>
     <a:masterClrMapping/>
   </p:clrMapOvr>
-  <mc:AlternateContent xmlns:mc="http://schemas.openxmlformats.org/markup-compatibility/2006">
-    <mc:Choice xmlns:p14="http://schemas.microsoft.com/office/powerpoint/2010/main" Requires="p14">
+  <mc:AlternateContent xmlns:mc="http://schemas.openxmlformats.org/markup-compatibility/2006" xmlns:p14="http://schemas.microsoft.com/office/powerpoint/2010/main">
+    <mc:Choice Requires="p14">
       <p:transition spd="slow" p14:dur="2000">
         <p14:prism isContent="1"/>
       </p:transition>
     </mc:Choice>
-    <mc:Fallback>
+    <mc:Fallback xmlns="">
       <p:transition spd="slow">
         <p:fade/>
       </p:transition>
@@ -4194,15 +4194,7 @@
             </a:r>
             <a:r>
               <a:rPr lang="en-US" dirty="0" smtClean="0"/>
-              <a:t>, </a:t>
-            </a:r>
-            <a:r>
-              <a:rPr lang="en-US" dirty="0" smtClean="0"/>
-              <a:t>a solution is presented that </a:t>
-            </a:r>
-            <a:r>
-              <a:rPr lang="en-US" dirty="0" smtClean="0"/>
-              <a:t>uses C++ templates.</a:t>
+              <a:t>, a solution is presented that uses C++ templates.</a:t>
             </a:r>
           </a:p>
           <a:p>
@@ -4789,13 +4781,8 @@
             </a:r>
             <a:r>
               <a:rPr lang="en-US" dirty="0" smtClean="0"/>
-              <a:t> graders </a:t>
-            </a:r>
-            <a:r>
-              <a:rPr lang="en-US" dirty="0" smtClean="0"/>
-              <a:t>understand (rules of Abelian Groups for the Math Geeks).</a:t>
-            </a:r>
-            <a:endParaRPr lang="en-US" dirty="0" smtClean="0"/>
+              <a:t> graders understand (rules of Abelian Groups for the Math Geeks).</a:t>
+            </a:r>
           </a:p>
           <a:p>
             <a:pPr>
@@ -4845,13 +4832,13 @@
   <p:clrMapOvr>
     <a:masterClrMapping/>
   </p:clrMapOvr>
-  <mc:AlternateContent xmlns:mc="http://schemas.openxmlformats.org/markup-compatibility/2006">
-    <mc:Choice xmlns:p14="http://schemas.microsoft.com/office/powerpoint/2010/main" Requires="p14">
+  <mc:AlternateContent xmlns:mc="http://schemas.openxmlformats.org/markup-compatibility/2006" xmlns:p14="http://schemas.microsoft.com/office/powerpoint/2010/main">
+    <mc:Choice Requires="p14">
       <p:transition spd="slow" p14:dur="1600">
         <p14:conveyor dir="l"/>
       </p:transition>
     </mc:Choice>
-    <mc:Fallback>
+    <mc:Fallback xmlns="">
       <p:transition spd="slow">
         <p:fade/>
       </p:transition>
@@ -5673,11 +5660,7 @@
             </a:r>
             <a:r>
               <a:rPr lang="en-US" dirty="0" smtClean="0"/>
-              <a:t>completely a </a:t>
-            </a:r>
-            <a:r>
-              <a:rPr lang="en-US" dirty="0" smtClean="0"/>
-              <a:t>type, </a:t>
+              <a:t>completely a type, </a:t>
             </a:r>
             <a:r>
               <a:rPr lang="en-US" i="1" dirty="0" smtClean="0"/>
@@ -5700,13 +5683,13 @@
   <p:clrMapOvr>
     <a:masterClrMapping/>
   </p:clrMapOvr>
-  <mc:AlternateContent xmlns:mc="http://schemas.openxmlformats.org/markup-compatibility/2006">
-    <mc:Choice xmlns:p14="http://schemas.microsoft.com/office/powerpoint/2010/main" Requires="p14">
+  <mc:AlternateContent xmlns:mc="http://schemas.openxmlformats.org/markup-compatibility/2006" xmlns:p14="http://schemas.microsoft.com/office/powerpoint/2010/main">
+    <mc:Choice Requires="p14">
       <p:transition spd="slow" p14:dur="2000">
         <p14:prism isContent="1"/>
       </p:transition>
     </mc:Choice>
-    <mc:Fallback>
+    <mc:Fallback xmlns="">
       <p:transition spd="slow">
         <p:fade/>
       </p:transition>
@@ -5964,13 +5947,13 @@
   <p:clrMapOvr>
     <a:masterClrMapping/>
   </p:clrMapOvr>
-  <mc:AlternateContent xmlns:mc="http://schemas.openxmlformats.org/markup-compatibility/2006">
-    <mc:Choice xmlns:p14="http://schemas.microsoft.com/office/powerpoint/2010/main" Requires="p14">
+  <mc:AlternateContent xmlns:mc="http://schemas.openxmlformats.org/markup-compatibility/2006" xmlns:p14="http://schemas.microsoft.com/office/powerpoint/2010/main">
+    <mc:Choice Requires="p14">
       <p:transition spd="slow" p14:dur="1600">
         <p14:conveyor dir="l"/>
       </p:transition>
     </mc:Choice>
-    <mc:Fallback>
+    <mc:Fallback xmlns="">
       <p:transition spd="slow">
         <p:fade/>
       </p:transition>
@@ -7041,13 +7024,13 @@
   <p:clrMapOvr>
     <a:masterClrMapping/>
   </p:clrMapOvr>
-  <mc:AlternateContent xmlns:mc="http://schemas.openxmlformats.org/markup-compatibility/2006">
-    <mc:Choice xmlns:p14="http://schemas.microsoft.com/office/powerpoint/2010/main" Requires="p14">
+  <mc:AlternateContent xmlns:mc="http://schemas.openxmlformats.org/markup-compatibility/2006" xmlns:p14="http://schemas.microsoft.com/office/powerpoint/2010/main">
+    <mc:Choice Requires="p14">
       <p:transition spd="slow" p14:dur="2000">
         <p14:prism isContent="1"/>
       </p:transition>
     </mc:Choice>
-    <mc:Fallback>
+    <mc:Fallback xmlns="">
       <p:transition spd="slow">
         <p:fade/>
       </p:transition>
@@ -7225,15 +7208,7 @@
           <a:p>
             <a:r>
               <a:rPr lang="en-US" dirty="0" smtClean="0"/>
-              <a:t>Can be </a:t>
-            </a:r>
-            <a:r>
-              <a:rPr lang="en-US" dirty="0" smtClean="0"/>
-              <a:t>implemented and/or used </a:t>
-            </a:r>
-            <a:r>
-              <a:rPr lang="en-US" dirty="0" smtClean="0"/>
-              <a:t>in other languages.</a:t>
+              <a:t>Can be implemented and/or used in other languages.</a:t>
             </a:r>
             <a:endParaRPr lang="en-US" dirty="0"/>
           </a:p>
@@ -7304,11 +7279,19 @@
             </a:r>
             <a:r>
               <a:rPr lang="en-US" sz="2000" dirty="0" smtClean="0"/>
-              <a:t> - </a:t>
-            </a:r>
+              <a:t> - slower.</a:t>
+            </a:r>
+          </a:p>
+          <a:p>
             <a:r>
               <a:rPr lang="en-US" sz="2000" dirty="0" smtClean="0"/>
-              <a:t>slower</a:t>
+              <a:t>Dimensional information has to be stored in the value - more memory required (about double)</a:t>
+            </a:r>
+          </a:p>
+          <a:p>
+            <a:r>
+              <a:rPr lang="en-US" sz="2000" dirty="0" smtClean="0"/>
+              <a:t>F# completely removes the unit information from the runtime code, so no space or time penalty</a:t>
             </a:r>
             <a:r>
               <a:rPr lang="en-US" sz="2000" dirty="0" smtClean="0"/>
@@ -7317,14 +7300,16 @@
           </a:p>
           <a:p>
             <a:r>
+              <a:rPr lang="en-US" sz="2000" dirty="0" err="1" smtClean="0"/>
+              <a:t>Intellisense</a:t>
+            </a:r>
+            <a:r>
               <a:rPr lang="en-US" sz="2000" dirty="0" smtClean="0"/>
-              <a:t>Dimensional information has to be stored in the value - more memory required (about double)</a:t>
-            </a:r>
-          </a:p>
-          <a:p>
-            <a:r>
-              <a:rPr lang="en-US" sz="2000" dirty="0" smtClean="0"/>
-              <a:t>F# completely removes the unit information from the runtime code, so no space or time penalty.</a:t>
+              <a:t> only knows about </a:t>
+            </a:r>
+            <a:r>
+              <a:rPr lang="en-US" sz="2000" smtClean="0"/>
+              <a:t>“Quantity”</a:t>
             </a:r>
             <a:endParaRPr lang="en-US" sz="2000" dirty="0"/>
           </a:p>
@@ -7340,13 +7325,13 @@
   <p:clrMapOvr>
     <a:masterClrMapping/>
   </p:clrMapOvr>
-  <mc:AlternateContent xmlns:mc="http://schemas.openxmlformats.org/markup-compatibility/2006">
-    <mc:Choice xmlns:p14="http://schemas.microsoft.com/office/powerpoint/2010/main" Requires="p14">
+  <mc:AlternateContent xmlns:mc="http://schemas.openxmlformats.org/markup-compatibility/2006" xmlns:p14="http://schemas.microsoft.com/office/powerpoint/2010/main">
+    <mc:Choice Requires="p14">
       <p:transition spd="slow" p14:dur="1600">
         <p14:conveyor dir="l"/>
       </p:transition>
     </mc:Choice>
-    <mc:Fallback>
+    <mc:Fallback xmlns="">
       <p:transition spd="slow">
         <p:fade/>
       </p:transition>
@@ -7499,11 +7484,7 @@
             </a:pPr>
             <a:r>
               <a:rPr lang="en-US" dirty="0" smtClean="0"/>
-              <a:t>BOOST </a:t>
-            </a:r>
-            <a:r>
-              <a:rPr lang="en-US" dirty="0" smtClean="0"/>
-              <a:t>Units Documentation</a:t>
+              <a:t>BOOST Units Documentation</a:t>
             </a:r>
             <a:r>
               <a:rPr lang="en-US" dirty="0"/>
@@ -7566,13 +7547,13 @@
   <p:clrMapOvr>
     <a:masterClrMapping/>
   </p:clrMapOvr>
-  <mc:AlternateContent xmlns:mc="http://schemas.openxmlformats.org/markup-compatibility/2006">
-    <mc:Choice xmlns:p14="http://schemas.microsoft.com/office/powerpoint/2010/main" Requires="p14">
+  <mc:AlternateContent xmlns:mc="http://schemas.openxmlformats.org/markup-compatibility/2006" xmlns:p14="http://schemas.microsoft.com/office/powerpoint/2010/main">
+    <mc:Choice Requires="p14">
       <p:transition spd="slow" p14:dur="2000">
         <p14:prism isContent="1"/>
       </p:transition>
     </mc:Choice>
-    <mc:Fallback>
+    <mc:Fallback xmlns="">
       <p:transition spd="slow">
         <p:fade/>
       </p:transition>

</xml_diff>